<commit_message>
Made few changes to the code
</commit_message>
<xml_diff>
--- a/Project Presentation/Project PPT.pptx
+++ b/Project Presentation/Project PPT.pptx
@@ -7134,13 +7134,18 @@
           <a:p>
             <a:pPr algn="ctr"/>
             <a:r>
-              <a:rPr lang="en-US" dirty="0">
+              <a:rPr lang="en-US">
                 <a:solidFill>
                   <a:schemeClr val="dk1"/>
                 </a:solidFill>
               </a:rPr>
-              <a:t>User Request </a:t>
-            </a:r>
+              <a:t>User Post </a:t>
+            </a:r>
+            <a:endParaRPr lang="en-US" dirty="0">
+              <a:solidFill>
+                <a:schemeClr val="dk1"/>
+              </a:solidFill>
+            </a:endParaRPr>
           </a:p>
         </p:txBody>
       </p:sp>

</xml_diff>